<commit_message>
title website and logo update
</commit_message>
<xml_diff>
--- a/PrésentationP12.pptx
+++ b/PrésentationP12.pptx
@@ -4493,13 +4493,8 @@
             </a:pPr>
             <a:r>
               <a:rPr lang="fr-FR" dirty="0"/>
-              <a:t> Difficultés : installation i18n</a:t>
-            </a:r>
-            <a:r>
-              <a:rPr lang="fr-FR"/>
-              <a:t>, couleurs du site, s</a:t>
-            </a:r>
-            <a:endParaRPr lang="fr-FR" dirty="0"/>
+              <a:t> Difficultés : installation i18n, couleurs du site (accessibilité), </a:t>
+            </a:r>
           </a:p>
         </p:txBody>
       </p:sp>

</xml_diff>